<commit_message>
updated project descriptions and our notes
</commit_message>
<xml_diff>
--- a/Presentation/Presentazione Dispositivi.pptx
+++ b/Presentation/Presentazione Dispositivi.pptx
@@ -187,7 +187,7 @@
           <a:noFill/>
           <a:extLst>
             <a:ext uri="{909E8E84-426E-40dd-AFC4-6F175D3DCCD1}">
-              <a14:hiddenFill xmlns="" xmlns:a14="http://schemas.microsoft.com/office/drawing/2010/main">
+              <a14:hiddenFill xmlns:a14="http://schemas.microsoft.com/office/drawing/2010/main" xmlns="">
                 <a:solidFill>
                   <a:srgbClr val="FFFFFF"/>
                 </a:solidFill>
@@ -247,7 +247,7 @@
             </a:ln>
             <a:extLst>
               <a:ext uri="{91240B29-F687-4f45-9708-019B960494DF}">
-                <a14:hiddenLine xmlns="" xmlns:a14="http://schemas.microsoft.com/office/drawing/2010/main" w="9525">
+                <a14:hiddenLine xmlns:a14="http://schemas.microsoft.com/office/drawing/2010/main" xmlns="" w="9525">
                   <a:solidFill>
                     <a:srgbClr val="000000"/>
                   </a:solidFill>
@@ -337,7 +337,7 @@
             </a:ln>
             <a:extLst>
               <a:ext uri="{91240B29-F687-4f45-9708-019B960494DF}">
-                <a14:hiddenLine xmlns="" xmlns:a14="http://schemas.microsoft.com/office/drawing/2010/main" w="9525">
+                <a14:hiddenLine xmlns:a14="http://schemas.microsoft.com/office/drawing/2010/main" xmlns="" w="9525">
                   <a:solidFill>
                     <a:srgbClr val="000000"/>
                   </a:solidFill>
@@ -427,7 +427,7 @@
             </a:ln>
             <a:extLst>
               <a:ext uri="{91240B29-F687-4f45-9708-019B960494DF}">
-                <a14:hiddenLine xmlns="" xmlns:a14="http://schemas.microsoft.com/office/drawing/2010/main" w="9525">
+                <a14:hiddenLine xmlns:a14="http://schemas.microsoft.com/office/drawing/2010/main" xmlns="" w="9525">
                   <a:solidFill>
                     <a:srgbClr val="000000"/>
                   </a:solidFill>
@@ -461,7 +461,7 @@
             </a:ln>
             <a:extLst>
               <a:ext uri="{91240B29-F687-4f45-9708-019B960494DF}">
-                <a14:hiddenLine xmlns="" xmlns:a14="http://schemas.microsoft.com/office/drawing/2010/main" w="9525">
+                <a14:hiddenLine xmlns:a14="http://schemas.microsoft.com/office/drawing/2010/main" xmlns="" w="9525">
                   <a:solidFill>
                     <a:srgbClr val="000000"/>
                   </a:solidFill>
@@ -551,7 +551,7 @@
             </a:ln>
             <a:extLst>
               <a:ext uri="{91240B29-F687-4f45-9708-019B960494DF}">
-                <a14:hiddenLine xmlns="" xmlns:a14="http://schemas.microsoft.com/office/drawing/2010/main" w="9525">
+                <a14:hiddenLine xmlns:a14="http://schemas.microsoft.com/office/drawing/2010/main" xmlns="" w="9525">
                   <a:solidFill>
                     <a:srgbClr val="000000"/>
                   </a:solidFill>
@@ -613,7 +613,7 @@
             </a:ln>
             <a:extLst>
               <a:ext uri="{91240B29-F687-4f45-9708-019B960494DF}">
-                <a14:hiddenLine xmlns="" xmlns:a14="http://schemas.microsoft.com/office/drawing/2010/main" w="9525">
+                <a14:hiddenLine xmlns:a14="http://schemas.microsoft.com/office/drawing/2010/main" xmlns="" w="9525">
                   <a:solidFill>
                     <a:srgbClr val="000000"/>
                   </a:solidFill>
@@ -675,7 +675,7 @@
             </a:ln>
             <a:extLst>
               <a:ext uri="{91240B29-F687-4f45-9708-019B960494DF}">
-                <a14:hiddenLine xmlns="" xmlns:a14="http://schemas.microsoft.com/office/drawing/2010/main" w="9525">
+                <a14:hiddenLine xmlns:a14="http://schemas.microsoft.com/office/drawing/2010/main" xmlns="" w="9525">
                   <a:solidFill>
                     <a:srgbClr val="000000"/>
                   </a:solidFill>
@@ -765,7 +765,7 @@
             </a:ln>
             <a:extLst>
               <a:ext uri="{91240B29-F687-4f45-9708-019B960494DF}">
-                <a14:hiddenLine xmlns="" xmlns:a14="http://schemas.microsoft.com/office/drawing/2010/main" w="9525">
+                <a14:hiddenLine xmlns:a14="http://schemas.microsoft.com/office/drawing/2010/main" xmlns="" w="9525">
                   <a:solidFill>
                     <a:srgbClr val="000000"/>
                   </a:solidFill>
@@ -827,7 +827,7 @@
             </a:ln>
             <a:extLst>
               <a:ext uri="{91240B29-F687-4f45-9708-019B960494DF}">
-                <a14:hiddenLine xmlns="" xmlns:a14="http://schemas.microsoft.com/office/drawing/2010/main" w="9525">
+                <a14:hiddenLine xmlns:a14="http://schemas.microsoft.com/office/drawing/2010/main" xmlns="" w="9525">
                   <a:solidFill>
                     <a:srgbClr val="000000"/>
                   </a:solidFill>
@@ -889,7 +889,7 @@
             </a:ln>
             <a:extLst>
               <a:ext uri="{91240B29-F687-4f45-9708-019B960494DF}">
-                <a14:hiddenLine xmlns="" xmlns:a14="http://schemas.microsoft.com/office/drawing/2010/main" w="9525">
+                <a14:hiddenLine xmlns:a14="http://schemas.microsoft.com/office/drawing/2010/main" xmlns="" w="9525">
                   <a:solidFill>
                     <a:srgbClr val="000000"/>
                   </a:solidFill>
@@ -979,7 +979,7 @@
             </a:ln>
             <a:extLst>
               <a:ext uri="{91240B29-F687-4f45-9708-019B960494DF}">
-                <a14:hiddenLine xmlns="" xmlns:a14="http://schemas.microsoft.com/office/drawing/2010/main" w="9525">
+                <a14:hiddenLine xmlns:a14="http://schemas.microsoft.com/office/drawing/2010/main" xmlns="" w="9525">
                   <a:solidFill>
                     <a:srgbClr val="000000"/>
                   </a:solidFill>
@@ -1069,7 +1069,7 @@
             </a:ln>
             <a:extLst>
               <a:ext uri="{91240B29-F687-4f45-9708-019B960494DF}">
-                <a14:hiddenLine xmlns="" xmlns:a14="http://schemas.microsoft.com/office/drawing/2010/main" w="9525">
+                <a14:hiddenLine xmlns:a14="http://schemas.microsoft.com/office/drawing/2010/main" xmlns="" w="9525">
                   <a:solidFill>
                     <a:srgbClr val="000000"/>
                   </a:solidFill>
@@ -1131,7 +1131,7 @@
             </a:ln>
             <a:extLst>
               <a:ext uri="{91240B29-F687-4f45-9708-019B960494DF}">
-                <a14:hiddenLine xmlns="" xmlns:a14="http://schemas.microsoft.com/office/drawing/2010/main" w="9525">
+                <a14:hiddenLine xmlns:a14="http://schemas.microsoft.com/office/drawing/2010/main" xmlns="" w="9525">
                   <a:solidFill>
                     <a:srgbClr val="000000"/>
                   </a:solidFill>
@@ -1241,7 +1241,7 @@
             </a:ln>
             <a:extLst>
               <a:ext uri="{91240B29-F687-4f45-9708-019B960494DF}">
-                <a14:hiddenLine xmlns="" xmlns:a14="http://schemas.microsoft.com/office/drawing/2010/main" w="9525">
+                <a14:hiddenLine xmlns:a14="http://schemas.microsoft.com/office/drawing/2010/main" xmlns="" w="9525">
                   <a:solidFill>
                     <a:srgbClr val="000000"/>
                   </a:solidFill>
@@ -1303,7 +1303,7 @@
             </a:ln>
             <a:extLst>
               <a:ext uri="{91240B29-F687-4f45-9708-019B960494DF}">
-                <a14:hiddenLine xmlns="" xmlns:a14="http://schemas.microsoft.com/office/drawing/2010/main" w="9525">
+                <a14:hiddenLine xmlns:a14="http://schemas.microsoft.com/office/drawing/2010/main" xmlns="" w="9525">
                   <a:solidFill>
                     <a:srgbClr val="000000"/>
                   </a:solidFill>
@@ -1393,7 +1393,7 @@
             </a:ln>
             <a:extLst>
               <a:ext uri="{91240B29-F687-4f45-9708-019B960494DF}">
-                <a14:hiddenLine xmlns="" xmlns:a14="http://schemas.microsoft.com/office/drawing/2010/main" w="9525">
+                <a14:hiddenLine xmlns:a14="http://schemas.microsoft.com/office/drawing/2010/main" xmlns="" w="9525">
                   <a:solidFill>
                     <a:srgbClr val="000000"/>
                   </a:solidFill>
@@ -1483,7 +1483,7 @@
             </a:ln>
             <a:extLst>
               <a:ext uri="{91240B29-F687-4f45-9708-019B960494DF}">
-                <a14:hiddenLine xmlns="" xmlns:a14="http://schemas.microsoft.com/office/drawing/2010/main" w="9525">
+                <a14:hiddenLine xmlns:a14="http://schemas.microsoft.com/office/drawing/2010/main" xmlns="" w="9525">
                   <a:solidFill>
                     <a:srgbClr val="000000"/>
                   </a:solidFill>
@@ -1545,7 +1545,7 @@
             </a:ln>
             <a:extLst>
               <a:ext uri="{91240B29-F687-4f45-9708-019B960494DF}">
-                <a14:hiddenLine xmlns="" xmlns:a14="http://schemas.microsoft.com/office/drawing/2010/main" w="9525">
+                <a14:hiddenLine xmlns:a14="http://schemas.microsoft.com/office/drawing/2010/main" xmlns="" w="9525">
                   <a:solidFill>
                     <a:srgbClr val="000000"/>
                   </a:solidFill>
@@ -1635,7 +1635,7 @@
             </a:ln>
             <a:extLst>
               <a:ext uri="{91240B29-F687-4f45-9708-019B960494DF}">
-                <a14:hiddenLine xmlns="" xmlns:a14="http://schemas.microsoft.com/office/drawing/2010/main" w="9525">
+                <a14:hiddenLine xmlns:a14="http://schemas.microsoft.com/office/drawing/2010/main" xmlns="" w="9525">
                   <a:solidFill>
                     <a:srgbClr val="000000"/>
                   </a:solidFill>
@@ -1725,7 +1725,7 @@
             </a:ln>
             <a:extLst>
               <a:ext uri="{91240B29-F687-4f45-9708-019B960494DF}">
-                <a14:hiddenLine xmlns="" xmlns:a14="http://schemas.microsoft.com/office/drawing/2010/main" w="9525">
+                <a14:hiddenLine xmlns:a14="http://schemas.microsoft.com/office/drawing/2010/main" xmlns="" w="9525">
                   <a:solidFill>
                     <a:srgbClr val="000000"/>
                   </a:solidFill>
@@ -1781,7 +1781,7 @@
             </a:ln>
             <a:extLst>
               <a:ext uri="{91240B29-F687-4f45-9708-019B960494DF}">
-                <a14:hiddenLine xmlns="" xmlns:a14="http://schemas.microsoft.com/office/drawing/2010/main" w="9525">
+                <a14:hiddenLine xmlns:a14="http://schemas.microsoft.com/office/drawing/2010/main" xmlns="" w="9525">
                   <a:solidFill>
                     <a:srgbClr val="000000"/>
                   </a:solidFill>
@@ -1871,7 +1871,7 @@
             </a:ln>
             <a:extLst>
               <a:ext uri="{91240B29-F687-4f45-9708-019B960494DF}">
-                <a14:hiddenLine xmlns="" xmlns:a14="http://schemas.microsoft.com/office/drawing/2010/main" w="9525">
+                <a14:hiddenLine xmlns:a14="http://schemas.microsoft.com/office/drawing/2010/main" xmlns="" w="9525">
                   <a:solidFill>
                     <a:srgbClr val="000000"/>
                   </a:solidFill>
@@ -1927,7 +1927,7 @@
             </a:ln>
             <a:extLst>
               <a:ext uri="{91240B29-F687-4f45-9708-019B960494DF}">
-                <a14:hiddenLine xmlns="" xmlns:a14="http://schemas.microsoft.com/office/drawing/2010/main" w="9525">
+                <a14:hiddenLine xmlns:a14="http://schemas.microsoft.com/office/drawing/2010/main" xmlns="" w="9525">
                   <a:solidFill>
                     <a:srgbClr val="000000"/>
                   </a:solidFill>
@@ -2017,7 +2017,7 @@
             </a:ln>
             <a:extLst>
               <a:ext uri="{91240B29-F687-4f45-9708-019B960494DF}">
-                <a14:hiddenLine xmlns="" xmlns:a14="http://schemas.microsoft.com/office/drawing/2010/main" w="9525">
+                <a14:hiddenLine xmlns:a14="http://schemas.microsoft.com/office/drawing/2010/main" xmlns="" w="9525">
                   <a:solidFill>
                     <a:srgbClr val="000000"/>
                   </a:solidFill>
@@ -2085,7 +2085,7 @@
             </a:ln>
             <a:extLst>
               <a:ext uri="{91240B29-F687-4f45-9708-019B960494DF}">
-                <a14:hiddenLine xmlns="" xmlns:a14="http://schemas.microsoft.com/office/drawing/2010/main" w="9525">
+                <a14:hiddenLine xmlns:a14="http://schemas.microsoft.com/office/drawing/2010/main" xmlns="" w="9525">
                   <a:solidFill>
                     <a:srgbClr val="000000"/>
                   </a:solidFill>
@@ -2175,7 +2175,7 @@
             </a:ln>
             <a:extLst>
               <a:ext uri="{91240B29-F687-4f45-9708-019B960494DF}">
-                <a14:hiddenLine xmlns="" xmlns:a14="http://schemas.microsoft.com/office/drawing/2010/main" w="9525">
+                <a14:hiddenLine xmlns:a14="http://schemas.microsoft.com/office/drawing/2010/main" xmlns="" w="9525">
                   <a:solidFill>
                     <a:srgbClr val="000000"/>
                   </a:solidFill>
@@ -2243,7 +2243,7 @@
             </a:ln>
             <a:extLst>
               <a:ext uri="{91240B29-F687-4f45-9708-019B960494DF}">
-                <a14:hiddenLine xmlns="" xmlns:a14="http://schemas.microsoft.com/office/drawing/2010/main" w="9525">
+                <a14:hiddenLine xmlns:a14="http://schemas.microsoft.com/office/drawing/2010/main" xmlns="" w="9525">
                   <a:solidFill>
                     <a:srgbClr val="000000"/>
                   </a:solidFill>
@@ -2333,7 +2333,7 @@
             </a:ln>
             <a:extLst>
               <a:ext uri="{91240B29-F687-4f45-9708-019B960494DF}">
-                <a14:hiddenLine xmlns="" xmlns:a14="http://schemas.microsoft.com/office/drawing/2010/main" w="9525">
+                <a14:hiddenLine xmlns:a14="http://schemas.microsoft.com/office/drawing/2010/main" xmlns="" w="9525">
                   <a:solidFill>
                     <a:srgbClr val="000000"/>
                   </a:solidFill>
@@ -2367,7 +2367,7 @@
             </a:ln>
             <a:extLst>
               <a:ext uri="{91240B29-F687-4f45-9708-019B960494DF}">
-                <a14:hiddenLine xmlns="" xmlns:a14="http://schemas.microsoft.com/office/drawing/2010/main" w="9525">
+                <a14:hiddenLine xmlns:a14="http://schemas.microsoft.com/office/drawing/2010/main" xmlns="" w="9525">
                   <a:solidFill>
                     <a:srgbClr val="000000"/>
                   </a:solidFill>
@@ -2457,7 +2457,7 @@
             </a:ln>
             <a:extLst>
               <a:ext uri="{91240B29-F687-4f45-9708-019B960494DF}">
-                <a14:hiddenLine xmlns="" xmlns:a14="http://schemas.microsoft.com/office/drawing/2010/main" w="9525">
+                <a14:hiddenLine xmlns:a14="http://schemas.microsoft.com/office/drawing/2010/main" xmlns="" w="9525">
                   <a:solidFill>
                     <a:srgbClr val="000000"/>
                   </a:solidFill>
@@ -2519,7 +2519,7 @@
             </a:ln>
             <a:extLst>
               <a:ext uri="{91240B29-F687-4f45-9708-019B960494DF}">
-                <a14:hiddenLine xmlns="" xmlns:a14="http://schemas.microsoft.com/office/drawing/2010/main" w="9525">
+                <a14:hiddenLine xmlns:a14="http://schemas.microsoft.com/office/drawing/2010/main" xmlns="" w="9525">
                   <a:solidFill>
                     <a:srgbClr val="000000"/>
                   </a:solidFill>
@@ -2581,7 +2581,7 @@
             </a:ln>
             <a:extLst>
               <a:ext uri="{91240B29-F687-4f45-9708-019B960494DF}">
-                <a14:hiddenLine xmlns="" xmlns:a14="http://schemas.microsoft.com/office/drawing/2010/main" w="9525">
+                <a14:hiddenLine xmlns:a14="http://schemas.microsoft.com/office/drawing/2010/main" xmlns="" w="9525">
                   <a:solidFill>
                     <a:srgbClr val="000000"/>
                   </a:solidFill>
@@ -2671,7 +2671,7 @@
             </a:ln>
             <a:extLst>
               <a:ext uri="{91240B29-F687-4f45-9708-019B960494DF}">
-                <a14:hiddenLine xmlns="" xmlns:a14="http://schemas.microsoft.com/office/drawing/2010/main" w="9525">
+                <a14:hiddenLine xmlns:a14="http://schemas.microsoft.com/office/drawing/2010/main" xmlns="" w="9525">
                   <a:solidFill>
                     <a:srgbClr val="000000"/>
                   </a:solidFill>
@@ -2739,7 +2739,7 @@
             </a:ln>
             <a:extLst>
               <a:ext uri="{91240B29-F687-4f45-9708-019B960494DF}">
-                <a14:hiddenLine xmlns="" xmlns:a14="http://schemas.microsoft.com/office/drawing/2010/main" w="9525">
+                <a14:hiddenLine xmlns:a14="http://schemas.microsoft.com/office/drawing/2010/main" xmlns="" w="9525">
                   <a:solidFill>
                     <a:srgbClr val="000000"/>
                   </a:solidFill>
@@ -2801,7 +2801,7 @@
             </a:ln>
             <a:extLst>
               <a:ext uri="{91240B29-F687-4f45-9708-019B960494DF}">
-                <a14:hiddenLine xmlns="" xmlns:a14="http://schemas.microsoft.com/office/drawing/2010/main" w="9525">
+                <a14:hiddenLine xmlns:a14="http://schemas.microsoft.com/office/drawing/2010/main" xmlns="" w="9525">
                   <a:solidFill>
                     <a:srgbClr val="000000"/>
                   </a:solidFill>
@@ -2891,7 +2891,7 @@
             </a:ln>
             <a:extLst>
               <a:ext uri="{91240B29-F687-4f45-9708-019B960494DF}">
-                <a14:hiddenLine xmlns="" xmlns:a14="http://schemas.microsoft.com/office/drawing/2010/main" w="9525">
+                <a14:hiddenLine xmlns:a14="http://schemas.microsoft.com/office/drawing/2010/main" xmlns="" w="9525">
                   <a:solidFill>
                     <a:srgbClr val="000000"/>
                   </a:solidFill>
@@ -2953,7 +2953,7 @@
             </a:ln>
             <a:extLst>
               <a:ext uri="{91240B29-F687-4f45-9708-019B960494DF}">
-                <a14:hiddenLine xmlns="" xmlns:a14="http://schemas.microsoft.com/office/drawing/2010/main" w="9525">
+                <a14:hiddenLine xmlns:a14="http://schemas.microsoft.com/office/drawing/2010/main" xmlns="" w="9525">
                   <a:solidFill>
                     <a:srgbClr val="000000"/>
                   </a:solidFill>
@@ -3043,7 +3043,7 @@
             </a:ln>
             <a:extLst>
               <a:ext uri="{91240B29-F687-4f45-9708-019B960494DF}">
-                <a14:hiddenLine xmlns="" xmlns:a14="http://schemas.microsoft.com/office/drawing/2010/main" w="9525">
+                <a14:hiddenLine xmlns:a14="http://schemas.microsoft.com/office/drawing/2010/main" xmlns="" w="9525">
                   <a:solidFill>
                     <a:srgbClr val="000000"/>
                   </a:solidFill>
@@ -3105,7 +3105,7 @@
             </a:ln>
             <a:extLst>
               <a:ext uri="{91240B29-F687-4f45-9708-019B960494DF}">
-                <a14:hiddenLine xmlns="" xmlns:a14="http://schemas.microsoft.com/office/drawing/2010/main" w="9525">
+                <a14:hiddenLine xmlns:a14="http://schemas.microsoft.com/office/drawing/2010/main" xmlns="" w="9525">
                   <a:solidFill>
                     <a:srgbClr val="000000"/>
                   </a:solidFill>
@@ -3195,7 +3195,7 @@
             </a:ln>
             <a:extLst>
               <a:ext uri="{91240B29-F687-4f45-9708-019B960494DF}">
-                <a14:hiddenLine xmlns="" xmlns:a14="http://schemas.microsoft.com/office/drawing/2010/main" w="9525">
+                <a14:hiddenLine xmlns:a14="http://schemas.microsoft.com/office/drawing/2010/main" xmlns="" w="9525">
                   <a:solidFill>
                     <a:srgbClr val="000000"/>
                   </a:solidFill>
@@ -3229,7 +3229,7 @@
             </a:ln>
             <a:extLst>
               <a:ext uri="{91240B29-F687-4f45-9708-019B960494DF}">
-                <a14:hiddenLine xmlns="" xmlns:a14="http://schemas.microsoft.com/office/drawing/2010/main" w="9525">
+                <a14:hiddenLine xmlns:a14="http://schemas.microsoft.com/office/drawing/2010/main" xmlns="" w="9525">
                   <a:solidFill>
                     <a:srgbClr val="000000"/>
                   </a:solidFill>
@@ -3294,7 +3294,7 @@
             </a:ln>
             <a:extLst>
               <a:ext uri="{91240B29-F687-4f45-9708-019B960494DF}">
-                <a14:hiddenLine xmlns="" xmlns:a14="http://schemas.microsoft.com/office/drawing/2010/main" w="9525">
+                <a14:hiddenLine xmlns:a14="http://schemas.microsoft.com/office/drawing/2010/main" xmlns="" w="9525">
                   <a:solidFill>
                     <a:srgbClr val="000000"/>
                   </a:solidFill>
@@ -3384,7 +3384,7 @@
             </a:ln>
             <a:extLst>
               <a:ext uri="{91240B29-F687-4f45-9708-019B960494DF}">
-                <a14:hiddenLine xmlns="" xmlns:a14="http://schemas.microsoft.com/office/drawing/2010/main" w="9525">
+                <a14:hiddenLine xmlns:a14="http://schemas.microsoft.com/office/drawing/2010/main" xmlns="" w="9525">
                   <a:solidFill>
                     <a:srgbClr val="000000"/>
                   </a:solidFill>
@@ -3446,7 +3446,7 @@
             </a:ln>
             <a:extLst>
               <a:ext uri="{91240B29-F687-4f45-9708-019B960494DF}">
-                <a14:hiddenLine xmlns="" xmlns:a14="http://schemas.microsoft.com/office/drawing/2010/main" w="9525">
+                <a14:hiddenLine xmlns:a14="http://schemas.microsoft.com/office/drawing/2010/main" xmlns="" w="9525">
                   <a:solidFill>
                     <a:srgbClr val="000000"/>
                   </a:solidFill>
@@ -3536,7 +3536,7 @@
             </a:ln>
             <a:extLst>
               <a:ext uri="{91240B29-F687-4f45-9708-019B960494DF}">
-                <a14:hiddenLine xmlns="" xmlns:a14="http://schemas.microsoft.com/office/drawing/2010/main" w="9525">
+                <a14:hiddenLine xmlns:a14="http://schemas.microsoft.com/office/drawing/2010/main" xmlns="" w="9525">
                   <a:solidFill>
                     <a:srgbClr val="000000"/>
                   </a:solidFill>
@@ -3626,7 +3626,7 @@
             </a:ln>
             <a:extLst>
               <a:ext uri="{91240B29-F687-4f45-9708-019B960494DF}">
-                <a14:hiddenLine xmlns="" xmlns:a14="http://schemas.microsoft.com/office/drawing/2010/main" w="9525">
+                <a14:hiddenLine xmlns:a14="http://schemas.microsoft.com/office/drawing/2010/main" xmlns="" w="9525">
                   <a:solidFill>
                     <a:srgbClr val="000000"/>
                   </a:solidFill>
@@ -3691,7 +3691,7 @@
             </a:ln>
             <a:extLst>
               <a:ext uri="{91240B29-F687-4f45-9708-019B960494DF}">
-                <a14:hiddenLine xmlns="" xmlns:a14="http://schemas.microsoft.com/office/drawing/2010/main" w="9525">
+                <a14:hiddenLine xmlns:a14="http://schemas.microsoft.com/office/drawing/2010/main" xmlns="" w="9525">
                   <a:solidFill>
                     <a:srgbClr val="000000"/>
                   </a:solidFill>
@@ -3753,7 +3753,7 @@
             </a:ln>
             <a:extLst>
               <a:ext uri="{91240B29-F687-4f45-9708-019B960494DF}">
-                <a14:hiddenLine xmlns="" xmlns:a14="http://schemas.microsoft.com/office/drawing/2010/main" w="9525">
+                <a14:hiddenLine xmlns:a14="http://schemas.microsoft.com/office/drawing/2010/main" xmlns="" w="9525">
                   <a:solidFill>
                     <a:srgbClr val="000000"/>
                   </a:solidFill>
@@ -3843,7 +3843,7 @@
             </a:ln>
             <a:extLst>
               <a:ext uri="{91240B29-F687-4f45-9708-019B960494DF}">
-                <a14:hiddenLine xmlns="" xmlns:a14="http://schemas.microsoft.com/office/drawing/2010/main" w="9525">
+                <a14:hiddenLine xmlns:a14="http://schemas.microsoft.com/office/drawing/2010/main" xmlns="" w="9525">
                   <a:solidFill>
                     <a:srgbClr val="000000"/>
                   </a:solidFill>
@@ -3933,7 +3933,7 @@
             </a:ln>
             <a:extLst>
               <a:ext uri="{91240B29-F687-4f45-9708-019B960494DF}">
-                <a14:hiddenLine xmlns="" xmlns:a14="http://schemas.microsoft.com/office/drawing/2010/main" w="9525">
+                <a14:hiddenLine xmlns:a14="http://schemas.microsoft.com/office/drawing/2010/main" xmlns="" w="9525">
                   <a:solidFill>
                     <a:srgbClr val="000000"/>
                   </a:solidFill>
@@ -3995,7 +3995,7 @@
             </a:ln>
             <a:extLst>
               <a:ext uri="{91240B29-F687-4f45-9708-019B960494DF}">
-                <a14:hiddenLine xmlns="" xmlns:a14="http://schemas.microsoft.com/office/drawing/2010/main" w="9525">
+                <a14:hiddenLine xmlns:a14="http://schemas.microsoft.com/office/drawing/2010/main" xmlns="" w="9525">
                   <a:solidFill>
                     <a:srgbClr val="000000"/>
                   </a:solidFill>
@@ -4115,7 +4115,7 @@
             </a:ln>
             <a:extLst>
               <a:ext uri="{91240B29-F687-4f45-9708-019B960494DF}">
-                <a14:hiddenLine xmlns="" xmlns:a14="http://schemas.microsoft.com/office/drawing/2010/main" w="9525">
+                <a14:hiddenLine xmlns:a14="http://schemas.microsoft.com/office/drawing/2010/main" xmlns="" w="9525">
                   <a:solidFill>
                     <a:srgbClr val="000000"/>
                   </a:solidFill>
@@ -4183,7 +4183,7 @@
             </a:ln>
             <a:extLst>
               <a:ext uri="{91240B29-F687-4f45-9708-019B960494DF}">
-                <a14:hiddenLine xmlns="" xmlns:a14="http://schemas.microsoft.com/office/drawing/2010/main" w="9525">
+                <a14:hiddenLine xmlns:a14="http://schemas.microsoft.com/office/drawing/2010/main" xmlns="" w="9525">
                   <a:solidFill>
                     <a:srgbClr val="000000"/>
                   </a:solidFill>
@@ -4273,7 +4273,7 @@
             </a:ln>
             <a:extLst>
               <a:ext uri="{91240B29-F687-4f45-9708-019B960494DF}">
-                <a14:hiddenLine xmlns="" xmlns:a14="http://schemas.microsoft.com/office/drawing/2010/main" w="9525">
+                <a14:hiddenLine xmlns:a14="http://schemas.microsoft.com/office/drawing/2010/main" xmlns="" w="9525">
                   <a:solidFill>
                     <a:srgbClr val="000000"/>
                   </a:solidFill>
@@ -4413,7 +4413,7 @@
           <a:p>
             <a:fld id="{7FDBF50C-4ABB-48C4-BC36-F12119FAB571}" type="datetimeFigureOut">
               <a:rPr lang="it-IT" smtClean="0"/>
-              <a:t>10/06/2021</a:t>
+              <a:t>11/06/2021</a:t>
             </a:fld>
             <a:endParaRPr lang="it-IT"/>
           </a:p>
@@ -4465,7 +4465,7 @@
           <a:p>
             <a:fld id="{06021973-6F29-4C3C-B47D-AFC1FE0FEEAE}" type="slidenum">
               <a:rPr lang="it-IT" smtClean="0"/>
-              <a:t>‹N›</a:t>
+              <a:t>‹#›</a:t>
             </a:fld>
             <a:endParaRPr lang="it-IT"/>
           </a:p>
@@ -4680,7 +4680,7 @@
           <a:p>
             <a:fld id="{7FDBF50C-4ABB-48C4-BC36-F12119FAB571}" type="datetimeFigureOut">
               <a:rPr lang="it-IT" smtClean="0"/>
-              <a:t>10/06/2021</a:t>
+              <a:t>11/06/2021</a:t>
             </a:fld>
             <a:endParaRPr lang="it-IT"/>
           </a:p>
@@ -4722,7 +4722,7 @@
           <a:p>
             <a:fld id="{06021973-6F29-4C3C-B47D-AFC1FE0FEEAE}" type="slidenum">
               <a:rPr lang="it-IT" smtClean="0"/>
-              <a:t>‹N›</a:t>
+              <a:t>‹#›</a:t>
             </a:fld>
             <a:endParaRPr lang="it-IT"/>
           </a:p>
@@ -4876,7 +4876,7 @@
           <a:p>
             <a:fld id="{7FDBF50C-4ABB-48C4-BC36-F12119FAB571}" type="datetimeFigureOut">
               <a:rPr lang="it-IT" smtClean="0"/>
-              <a:t>10/06/2021</a:t>
+              <a:t>11/06/2021</a:t>
             </a:fld>
             <a:endParaRPr lang="it-IT"/>
           </a:p>
@@ -4918,7 +4918,7 @@
           <a:p>
             <a:fld id="{06021973-6F29-4C3C-B47D-AFC1FE0FEEAE}" type="slidenum">
               <a:rPr lang="it-IT" smtClean="0"/>
-              <a:t>‹N›</a:t>
+              <a:t>‹#›</a:t>
             </a:fld>
             <a:endParaRPr lang="it-IT"/>
           </a:p>
@@ -5139,7 +5139,7 @@
           <a:p>
             <a:fld id="{7FDBF50C-4ABB-48C4-BC36-F12119FAB571}" type="datetimeFigureOut">
               <a:rPr lang="it-IT" smtClean="0"/>
-              <a:t>10/06/2021</a:t>
+              <a:t>11/06/2021</a:t>
             </a:fld>
             <a:endParaRPr lang="it-IT"/>
           </a:p>
@@ -5181,7 +5181,7 @@
           <a:p>
             <a:fld id="{06021973-6F29-4C3C-B47D-AFC1FE0FEEAE}" type="slidenum">
               <a:rPr lang="it-IT" smtClean="0"/>
-              <a:t>‹N›</a:t>
+              <a:t>‹#›</a:t>
             </a:fld>
             <a:endParaRPr lang="it-IT"/>
           </a:p>
@@ -5573,7 +5573,7 @@
           <a:p>
             <a:fld id="{7FDBF50C-4ABB-48C4-BC36-F12119FAB571}" type="datetimeFigureOut">
               <a:rPr lang="it-IT" smtClean="0"/>
-              <a:t>10/06/2021</a:t>
+              <a:t>11/06/2021</a:t>
             </a:fld>
             <a:endParaRPr lang="it-IT"/>
           </a:p>
@@ -5615,7 +5615,7 @@
           <a:p>
             <a:fld id="{06021973-6F29-4C3C-B47D-AFC1FE0FEEAE}" type="slidenum">
               <a:rPr lang="it-IT" smtClean="0"/>
-              <a:t>‹N›</a:t>
+              <a:t>‹#›</a:t>
             </a:fld>
             <a:endParaRPr lang="it-IT"/>
           </a:p>
@@ -6119,7 +6119,7 @@
           <a:p>
             <a:fld id="{7FDBF50C-4ABB-48C4-BC36-F12119FAB571}" type="datetimeFigureOut">
               <a:rPr lang="it-IT" smtClean="0"/>
-              <a:t>10/06/2021</a:t>
+              <a:t>11/06/2021</a:t>
             </a:fld>
             <a:endParaRPr lang="it-IT"/>
           </a:p>
@@ -6161,7 +6161,7 @@
           <a:p>
             <a:fld id="{06021973-6F29-4C3C-B47D-AFC1FE0FEEAE}" type="slidenum">
               <a:rPr lang="it-IT" smtClean="0"/>
-              <a:t>‹N›</a:t>
+              <a:t>‹#›</a:t>
             </a:fld>
             <a:endParaRPr lang="it-IT"/>
           </a:p>
@@ -6839,7 +6839,7 @@
           <a:p>
             <a:fld id="{7FDBF50C-4ABB-48C4-BC36-F12119FAB571}" type="datetimeFigureOut">
               <a:rPr lang="it-IT" smtClean="0"/>
-              <a:t>10/06/2021</a:t>
+              <a:t>11/06/2021</a:t>
             </a:fld>
             <a:endParaRPr lang="it-IT"/>
           </a:p>
@@ -6881,7 +6881,7 @@
           <a:p>
             <a:fld id="{06021973-6F29-4C3C-B47D-AFC1FE0FEEAE}" type="slidenum">
               <a:rPr lang="it-IT" smtClean="0"/>
-              <a:t>‹N›</a:t>
+              <a:t>‹#›</a:t>
             </a:fld>
             <a:endParaRPr lang="it-IT"/>
           </a:p>
@@ -7009,7 +7009,7 @@
           <a:p>
             <a:fld id="{7FDBF50C-4ABB-48C4-BC36-F12119FAB571}" type="datetimeFigureOut">
               <a:rPr lang="it-IT" smtClean="0"/>
-              <a:t>10/06/2021</a:t>
+              <a:t>11/06/2021</a:t>
             </a:fld>
             <a:endParaRPr lang="it-IT"/>
           </a:p>
@@ -7051,7 +7051,7 @@
           <a:p>
             <a:fld id="{06021973-6F29-4C3C-B47D-AFC1FE0FEEAE}" type="slidenum">
               <a:rPr lang="it-IT" smtClean="0"/>
-              <a:t>‹N›</a:t>
+              <a:t>‹#›</a:t>
             </a:fld>
             <a:endParaRPr lang="it-IT"/>
           </a:p>
@@ -7189,7 +7189,7 @@
           <a:p>
             <a:fld id="{7FDBF50C-4ABB-48C4-BC36-F12119FAB571}" type="datetimeFigureOut">
               <a:rPr lang="it-IT" smtClean="0"/>
-              <a:t>10/06/2021</a:t>
+              <a:t>11/06/2021</a:t>
             </a:fld>
             <a:endParaRPr lang="it-IT"/>
           </a:p>
@@ -7231,7 +7231,7 @@
           <a:p>
             <a:fld id="{06021973-6F29-4C3C-B47D-AFC1FE0FEEAE}" type="slidenum">
               <a:rPr lang="it-IT" smtClean="0"/>
-              <a:t>‹N›</a:t>
+              <a:t>‹#›</a:t>
             </a:fld>
             <a:endParaRPr lang="it-IT"/>
           </a:p>
@@ -7359,7 +7359,7 @@
           <a:p>
             <a:fld id="{7FDBF50C-4ABB-48C4-BC36-F12119FAB571}" type="datetimeFigureOut">
               <a:rPr lang="it-IT" smtClean="0"/>
-              <a:t>10/06/2021</a:t>
+              <a:t>11/06/2021</a:t>
             </a:fld>
             <a:endParaRPr lang="it-IT"/>
           </a:p>
@@ -7401,7 +7401,7 @@
           <a:p>
             <a:fld id="{06021973-6F29-4C3C-B47D-AFC1FE0FEEAE}" type="slidenum">
               <a:rPr lang="it-IT" smtClean="0"/>
-              <a:t>‹N›</a:t>
+              <a:t>‹#›</a:t>
             </a:fld>
             <a:endParaRPr lang="it-IT"/>
           </a:p>
@@ -7609,7 +7609,7 @@
           <a:p>
             <a:fld id="{7FDBF50C-4ABB-48C4-BC36-F12119FAB571}" type="datetimeFigureOut">
               <a:rPr lang="it-IT" smtClean="0"/>
-              <a:t>10/06/2021</a:t>
+              <a:t>11/06/2021</a:t>
             </a:fld>
             <a:endParaRPr lang="it-IT"/>
           </a:p>
@@ -7651,7 +7651,7 @@
           <a:p>
             <a:fld id="{06021973-6F29-4C3C-B47D-AFC1FE0FEEAE}" type="slidenum">
               <a:rPr lang="it-IT" smtClean="0"/>
-              <a:t>‹N›</a:t>
+              <a:t>‹#›</a:t>
             </a:fld>
             <a:endParaRPr lang="it-IT"/>
           </a:p>
@@ -7841,7 +7841,7 @@
           <a:p>
             <a:fld id="{7FDBF50C-4ABB-48C4-BC36-F12119FAB571}" type="datetimeFigureOut">
               <a:rPr lang="it-IT" smtClean="0"/>
-              <a:t>10/06/2021</a:t>
+              <a:t>11/06/2021</a:t>
             </a:fld>
             <a:endParaRPr lang="it-IT"/>
           </a:p>
@@ -7883,7 +7883,7 @@
           <a:p>
             <a:fld id="{06021973-6F29-4C3C-B47D-AFC1FE0FEEAE}" type="slidenum">
               <a:rPr lang="it-IT" smtClean="0"/>
-              <a:t>‹N›</a:t>
+              <a:t>‹#›</a:t>
             </a:fld>
             <a:endParaRPr lang="it-IT"/>
           </a:p>
@@ -8222,7 +8222,7 @@
           <a:p>
             <a:fld id="{7FDBF50C-4ABB-48C4-BC36-F12119FAB571}" type="datetimeFigureOut">
               <a:rPr lang="it-IT" smtClean="0"/>
-              <a:t>10/06/2021</a:t>
+              <a:t>11/06/2021</a:t>
             </a:fld>
             <a:endParaRPr lang="it-IT"/>
           </a:p>
@@ -8264,7 +8264,7 @@
           <a:p>
             <a:fld id="{06021973-6F29-4C3C-B47D-AFC1FE0FEEAE}" type="slidenum">
               <a:rPr lang="it-IT" smtClean="0"/>
-              <a:t>‹N›</a:t>
+              <a:t>‹#›</a:t>
             </a:fld>
             <a:endParaRPr lang="it-IT"/>
           </a:p>
@@ -8340,7 +8340,7 @@
           <a:p>
             <a:fld id="{7FDBF50C-4ABB-48C4-BC36-F12119FAB571}" type="datetimeFigureOut">
               <a:rPr lang="it-IT" smtClean="0"/>
-              <a:t>10/06/2021</a:t>
+              <a:t>11/06/2021</a:t>
             </a:fld>
             <a:endParaRPr lang="it-IT"/>
           </a:p>
@@ -8382,7 +8382,7 @@
           <a:p>
             <a:fld id="{06021973-6F29-4C3C-B47D-AFC1FE0FEEAE}" type="slidenum">
               <a:rPr lang="it-IT" smtClean="0"/>
-              <a:t>‹N›</a:t>
+              <a:t>‹#›</a:t>
             </a:fld>
             <a:endParaRPr lang="it-IT"/>
           </a:p>
@@ -8435,7 +8435,7 @@
           <a:p>
             <a:fld id="{7FDBF50C-4ABB-48C4-BC36-F12119FAB571}" type="datetimeFigureOut">
               <a:rPr lang="it-IT" smtClean="0"/>
-              <a:t>10/06/2021</a:t>
+              <a:t>11/06/2021</a:t>
             </a:fld>
             <a:endParaRPr lang="it-IT"/>
           </a:p>
@@ -8477,7 +8477,7 @@
           <a:p>
             <a:fld id="{06021973-6F29-4C3C-B47D-AFC1FE0FEEAE}" type="slidenum">
               <a:rPr lang="it-IT" smtClean="0"/>
-              <a:t>‹N›</a:t>
+              <a:t>‹#›</a:t>
             </a:fld>
             <a:endParaRPr lang="it-IT"/>
           </a:p>
@@ -8684,7 +8684,7 @@
           <a:p>
             <a:fld id="{7FDBF50C-4ABB-48C4-BC36-F12119FAB571}" type="datetimeFigureOut">
               <a:rPr lang="it-IT" smtClean="0"/>
-              <a:t>10/06/2021</a:t>
+              <a:t>11/06/2021</a:t>
             </a:fld>
             <a:endParaRPr lang="it-IT"/>
           </a:p>
@@ -8726,7 +8726,7 @@
           <a:p>
             <a:fld id="{06021973-6F29-4C3C-B47D-AFC1FE0FEEAE}" type="slidenum">
               <a:rPr lang="it-IT" smtClean="0"/>
-              <a:t>‹N›</a:t>
+              <a:t>‹#›</a:t>
             </a:fld>
             <a:endParaRPr lang="it-IT"/>
           </a:p>
@@ -8964,7 +8964,7 @@
           <a:p>
             <a:fld id="{7FDBF50C-4ABB-48C4-BC36-F12119FAB571}" type="datetimeFigureOut">
               <a:rPr lang="it-IT" smtClean="0"/>
-              <a:t>10/06/2021</a:t>
+              <a:t>11/06/2021</a:t>
             </a:fld>
             <a:endParaRPr lang="it-IT"/>
           </a:p>
@@ -9006,7 +9006,7 @@
           <a:p>
             <a:fld id="{06021973-6F29-4C3C-B47D-AFC1FE0FEEAE}" type="slidenum">
               <a:rPr lang="it-IT" smtClean="0"/>
-              <a:t>‹N›</a:t>
+              <a:t>‹#›</a:t>
             </a:fld>
             <a:endParaRPr lang="it-IT"/>
           </a:p>
@@ -9080,7 +9080,7 @@
           <a:noFill/>
           <a:extLst>
             <a:ext uri="{909E8E84-426E-40dd-AFC4-6F175D3DCCD1}">
-              <a14:hiddenFill xmlns="" xmlns:a14="http://schemas.microsoft.com/office/drawing/2010/main">
+              <a14:hiddenFill xmlns:a14="http://schemas.microsoft.com/office/drawing/2010/main" xmlns="">
                 <a:solidFill>
                   <a:srgbClr val="FFFFFF"/>
                 </a:solidFill>
@@ -9154,7 +9154,7 @@
               </a:ln>
               <a:extLst>
                 <a:ext uri="{91240B29-F687-4f45-9708-019B960494DF}">
-                  <a14:hiddenLine xmlns="" xmlns:a14="http://schemas.microsoft.com/office/drawing/2010/main" w="9525">
+                  <a14:hiddenLine xmlns:a14="http://schemas.microsoft.com/office/drawing/2010/main" xmlns="" w="9525">
                     <a:solidFill>
                       <a:srgbClr val="000000"/>
                     </a:solidFill>
@@ -9244,7 +9244,7 @@
               </a:ln>
               <a:extLst>
                 <a:ext uri="{91240B29-F687-4f45-9708-019B960494DF}">
-                  <a14:hiddenLine xmlns="" xmlns:a14="http://schemas.microsoft.com/office/drawing/2010/main" w="9525">
+                  <a14:hiddenLine xmlns:a14="http://schemas.microsoft.com/office/drawing/2010/main" xmlns="" w="9525">
                     <a:solidFill>
                       <a:srgbClr val="000000"/>
                     </a:solidFill>
@@ -9334,7 +9334,7 @@
               </a:ln>
               <a:extLst>
                 <a:ext uri="{91240B29-F687-4f45-9708-019B960494DF}">
-                  <a14:hiddenLine xmlns="" xmlns:a14="http://schemas.microsoft.com/office/drawing/2010/main" w="9525">
+                  <a14:hiddenLine xmlns:a14="http://schemas.microsoft.com/office/drawing/2010/main" xmlns="" w="9525">
                     <a:solidFill>
                       <a:srgbClr val="000000"/>
                     </a:solidFill>
@@ -9396,7 +9396,7 @@
               </a:ln>
               <a:extLst>
                 <a:ext uri="{91240B29-F687-4f45-9708-019B960494DF}">
-                  <a14:hiddenLine xmlns="" xmlns:a14="http://schemas.microsoft.com/office/drawing/2010/main" w="9525">
+                  <a14:hiddenLine xmlns:a14="http://schemas.microsoft.com/office/drawing/2010/main" xmlns="" w="9525">
                     <a:solidFill>
                       <a:srgbClr val="000000"/>
                     </a:solidFill>
@@ -9486,7 +9486,7 @@
               </a:ln>
               <a:extLst>
                 <a:ext uri="{91240B29-F687-4f45-9708-019B960494DF}">
-                  <a14:hiddenLine xmlns="" xmlns:a14="http://schemas.microsoft.com/office/drawing/2010/main" w="9525">
+                  <a14:hiddenLine xmlns:a14="http://schemas.microsoft.com/office/drawing/2010/main" xmlns="" w="9525">
                     <a:solidFill>
                       <a:srgbClr val="000000"/>
                     </a:solidFill>
@@ -9548,7 +9548,7 @@
               </a:ln>
               <a:extLst>
                 <a:ext uri="{91240B29-F687-4f45-9708-019B960494DF}">
-                  <a14:hiddenLine xmlns="" xmlns:a14="http://schemas.microsoft.com/office/drawing/2010/main" w="9525">
+                  <a14:hiddenLine xmlns:a14="http://schemas.microsoft.com/office/drawing/2010/main" xmlns="" w="9525">
                     <a:solidFill>
                       <a:srgbClr val="000000"/>
                     </a:solidFill>
@@ -9610,7 +9610,7 @@
               </a:ln>
               <a:extLst>
                 <a:ext uri="{91240B29-F687-4f45-9708-019B960494DF}">
-                  <a14:hiddenLine xmlns="" xmlns:a14="http://schemas.microsoft.com/office/drawing/2010/main" w="9525">
+                  <a14:hiddenLine xmlns:a14="http://schemas.microsoft.com/office/drawing/2010/main" xmlns="" w="9525">
                     <a:solidFill>
                       <a:srgbClr val="000000"/>
                     </a:solidFill>
@@ -9700,7 +9700,7 @@
               </a:ln>
               <a:extLst>
                 <a:ext uri="{91240B29-F687-4f45-9708-019B960494DF}">
-                  <a14:hiddenLine xmlns="" xmlns:a14="http://schemas.microsoft.com/office/drawing/2010/main" w="9525">
+                  <a14:hiddenLine xmlns:a14="http://schemas.microsoft.com/office/drawing/2010/main" xmlns="" w="9525">
                     <a:solidFill>
                       <a:srgbClr val="000000"/>
                     </a:solidFill>
@@ -9790,7 +9790,7 @@
               </a:ln>
               <a:extLst>
                 <a:ext uri="{91240B29-F687-4f45-9708-019B960494DF}">
-                  <a14:hiddenLine xmlns="" xmlns:a14="http://schemas.microsoft.com/office/drawing/2010/main" w="9525">
+                  <a14:hiddenLine xmlns:a14="http://schemas.microsoft.com/office/drawing/2010/main" xmlns="" w="9525">
                     <a:solidFill>
                       <a:srgbClr val="000000"/>
                     </a:solidFill>
@@ -9852,7 +9852,7 @@
               </a:ln>
               <a:extLst>
                 <a:ext uri="{91240B29-F687-4f45-9708-019B960494DF}">
-                  <a14:hiddenLine xmlns="" xmlns:a14="http://schemas.microsoft.com/office/drawing/2010/main" w="9525">
+                  <a14:hiddenLine xmlns:a14="http://schemas.microsoft.com/office/drawing/2010/main" xmlns="" w="9525">
                     <a:solidFill>
                       <a:srgbClr val="000000"/>
                     </a:solidFill>
@@ -9962,7 +9962,7 @@
               </a:ln>
               <a:extLst>
                 <a:ext uri="{91240B29-F687-4f45-9708-019B960494DF}">
-                  <a14:hiddenLine xmlns="" xmlns:a14="http://schemas.microsoft.com/office/drawing/2010/main" w="9525">
+                  <a14:hiddenLine xmlns:a14="http://schemas.microsoft.com/office/drawing/2010/main" xmlns="" w="9525">
                     <a:solidFill>
                       <a:srgbClr val="000000"/>
                     </a:solidFill>
@@ -10046,7 +10046,7 @@
               </a:ln>
               <a:extLst>
                 <a:ext uri="{91240B29-F687-4f45-9708-019B960494DF}">
-                  <a14:hiddenLine xmlns="" xmlns:a14="http://schemas.microsoft.com/office/drawing/2010/main" w="9525">
+                  <a14:hiddenLine xmlns:a14="http://schemas.microsoft.com/office/drawing/2010/main" xmlns="" w="9525">
                     <a:solidFill>
                       <a:srgbClr val="000000"/>
                     </a:solidFill>
@@ -10108,7 +10108,7 @@
               </a:ln>
               <a:extLst>
                 <a:ext uri="{91240B29-F687-4f45-9708-019B960494DF}">
-                  <a14:hiddenLine xmlns="" xmlns:a14="http://schemas.microsoft.com/office/drawing/2010/main" w="9525">
+                  <a14:hiddenLine xmlns:a14="http://schemas.microsoft.com/office/drawing/2010/main" xmlns="" w="9525">
                     <a:solidFill>
                       <a:srgbClr val="000000"/>
                     </a:solidFill>
@@ -10170,7 +10170,7 @@
               </a:ln>
               <a:extLst>
                 <a:ext uri="{91240B29-F687-4f45-9708-019B960494DF}">
-                  <a14:hiddenLine xmlns="" xmlns:a14="http://schemas.microsoft.com/office/drawing/2010/main" w="9525">
+                  <a14:hiddenLine xmlns:a14="http://schemas.microsoft.com/office/drawing/2010/main" xmlns="" w="9525">
                     <a:solidFill>
                       <a:srgbClr val="000000"/>
                     </a:solidFill>
@@ -10260,7 +10260,7 @@
               </a:ln>
               <a:extLst>
                 <a:ext uri="{91240B29-F687-4f45-9708-019B960494DF}">
-                  <a14:hiddenLine xmlns="" xmlns:a14="http://schemas.microsoft.com/office/drawing/2010/main" w="9525">
+                  <a14:hiddenLine xmlns:a14="http://schemas.microsoft.com/office/drawing/2010/main" xmlns="" w="9525">
                     <a:solidFill>
                       <a:srgbClr val="000000"/>
                     </a:solidFill>
@@ -10294,7 +10294,7 @@
               </a:ln>
               <a:extLst>
                 <a:ext uri="{91240B29-F687-4f45-9708-019B960494DF}">
-                  <a14:hiddenLine xmlns="" xmlns:a14="http://schemas.microsoft.com/office/drawing/2010/main" w="9525">
+                  <a14:hiddenLine xmlns:a14="http://schemas.microsoft.com/office/drawing/2010/main" xmlns="" w="9525">
                     <a:solidFill>
                       <a:srgbClr val="000000"/>
                     </a:solidFill>
@@ -10359,7 +10359,7 @@
               </a:ln>
               <a:extLst>
                 <a:ext uri="{91240B29-F687-4f45-9708-019B960494DF}">
-                  <a14:hiddenLine xmlns="" xmlns:a14="http://schemas.microsoft.com/office/drawing/2010/main" w="9525">
+                  <a14:hiddenLine xmlns:a14="http://schemas.microsoft.com/office/drawing/2010/main" xmlns="" w="9525">
                     <a:solidFill>
                       <a:srgbClr val="000000"/>
                     </a:solidFill>
@@ -10449,7 +10449,7 @@
               </a:ln>
               <a:extLst>
                 <a:ext uri="{91240B29-F687-4f45-9708-019B960494DF}">
-                  <a14:hiddenLine xmlns="" xmlns:a14="http://schemas.microsoft.com/office/drawing/2010/main" w="9525">
+                  <a14:hiddenLine xmlns:a14="http://schemas.microsoft.com/office/drawing/2010/main" xmlns="" w="9525">
                     <a:solidFill>
                       <a:srgbClr val="000000"/>
                     </a:solidFill>
@@ -10511,7 +10511,7 @@
               </a:ln>
               <a:extLst>
                 <a:ext uri="{91240B29-F687-4f45-9708-019B960494DF}">
-                  <a14:hiddenLine xmlns="" xmlns:a14="http://schemas.microsoft.com/office/drawing/2010/main" w="9525">
+                  <a14:hiddenLine xmlns:a14="http://schemas.microsoft.com/office/drawing/2010/main" xmlns="" w="9525">
                     <a:solidFill>
                       <a:srgbClr val="000000"/>
                     </a:solidFill>
@@ -10601,7 +10601,7 @@
               </a:ln>
               <a:extLst>
                 <a:ext uri="{91240B29-F687-4f45-9708-019B960494DF}">
-                  <a14:hiddenLine xmlns="" xmlns:a14="http://schemas.microsoft.com/office/drawing/2010/main" w="9525">
+                  <a14:hiddenLine xmlns:a14="http://schemas.microsoft.com/office/drawing/2010/main" xmlns="" w="9525">
                     <a:solidFill>
                       <a:srgbClr val="000000"/>
                     </a:solidFill>
@@ -10666,7 +10666,7 @@
               </a:ln>
               <a:extLst>
                 <a:ext uri="{91240B29-F687-4f45-9708-019B960494DF}">
-                  <a14:hiddenLine xmlns="" xmlns:a14="http://schemas.microsoft.com/office/drawing/2010/main" w="9525">
+                  <a14:hiddenLine xmlns:a14="http://schemas.microsoft.com/office/drawing/2010/main" xmlns="" w="9525">
                     <a:solidFill>
                       <a:srgbClr val="000000"/>
                     </a:solidFill>
@@ -10728,7 +10728,7 @@
               </a:ln>
               <a:extLst>
                 <a:ext uri="{91240B29-F687-4f45-9708-019B960494DF}">
-                  <a14:hiddenLine xmlns="" xmlns:a14="http://schemas.microsoft.com/office/drawing/2010/main" w="9525">
+                  <a14:hiddenLine xmlns:a14="http://schemas.microsoft.com/office/drawing/2010/main" xmlns="" w="9525">
                     <a:solidFill>
                       <a:srgbClr val="000000"/>
                     </a:solidFill>
@@ -10818,7 +10818,7 @@
               </a:ln>
               <a:extLst>
                 <a:ext uri="{91240B29-F687-4f45-9708-019B960494DF}">
-                  <a14:hiddenLine xmlns="" xmlns:a14="http://schemas.microsoft.com/office/drawing/2010/main" w="9525">
+                  <a14:hiddenLine xmlns:a14="http://schemas.microsoft.com/office/drawing/2010/main" xmlns="" w="9525">
                     <a:solidFill>
                       <a:srgbClr val="000000"/>
                     </a:solidFill>
@@ -10908,7 +10908,7 @@
               </a:ln>
               <a:extLst>
                 <a:ext uri="{91240B29-F687-4f45-9708-019B960494DF}">
-                  <a14:hiddenLine xmlns="" xmlns:a14="http://schemas.microsoft.com/office/drawing/2010/main" w="9525">
+                  <a14:hiddenLine xmlns:a14="http://schemas.microsoft.com/office/drawing/2010/main" xmlns="" w="9525">
                     <a:solidFill>
                       <a:srgbClr val="000000"/>
                     </a:solidFill>
@@ -10973,7 +10973,7 @@
               </a:ln>
               <a:extLst>
                 <a:ext uri="{91240B29-F687-4f45-9708-019B960494DF}">
-                  <a14:hiddenLine xmlns="" xmlns:a14="http://schemas.microsoft.com/office/drawing/2010/main" w="9525">
+                  <a14:hiddenLine xmlns:a14="http://schemas.microsoft.com/office/drawing/2010/main" xmlns="" w="9525">
                     <a:solidFill>
                       <a:srgbClr val="000000"/>
                     </a:solidFill>
@@ -11093,7 +11093,7 @@
               </a:ln>
               <a:extLst>
                 <a:ext uri="{91240B29-F687-4f45-9708-019B960494DF}">
-                  <a14:hiddenLine xmlns="" xmlns:a14="http://schemas.microsoft.com/office/drawing/2010/main" w="9525">
+                  <a14:hiddenLine xmlns:a14="http://schemas.microsoft.com/office/drawing/2010/main" xmlns="" w="9525">
                     <a:solidFill>
                       <a:srgbClr val="000000"/>
                     </a:solidFill>
@@ -11191,7 +11191,7 @@
               </a:ln>
               <a:extLst>
                 <a:ext uri="{91240B29-F687-4f45-9708-019B960494DF}">
-                  <a14:hiddenLine xmlns="" xmlns:a14="http://schemas.microsoft.com/office/drawing/2010/main" w="9525">
+                  <a14:hiddenLine xmlns:a14="http://schemas.microsoft.com/office/drawing/2010/main" xmlns="" w="9525">
                     <a:solidFill>
                       <a:srgbClr val="000000"/>
                     </a:solidFill>
@@ -11306,7 +11306,7 @@
               </a:ln>
               <a:extLst>
                 <a:ext uri="{91240B29-F687-4f45-9708-019B960494DF}">
-                  <a14:hiddenLine xmlns="" xmlns:a14="http://schemas.microsoft.com/office/drawing/2010/main" w="9525">
+                  <a14:hiddenLine xmlns:a14="http://schemas.microsoft.com/office/drawing/2010/main" xmlns="" w="9525">
                     <a:solidFill>
                       <a:srgbClr val="000000"/>
                     </a:solidFill>
@@ -11396,7 +11396,7 @@
               </a:ln>
               <a:extLst>
                 <a:ext uri="{91240B29-F687-4f45-9708-019B960494DF}">
-                  <a14:hiddenLine xmlns="" xmlns:a14="http://schemas.microsoft.com/office/drawing/2010/main" w="9525">
+                  <a14:hiddenLine xmlns:a14="http://schemas.microsoft.com/office/drawing/2010/main" xmlns="" w="9525">
                     <a:solidFill>
                       <a:srgbClr val="000000"/>
                     </a:solidFill>
@@ -11461,7 +11461,7 @@
               </a:ln>
               <a:extLst>
                 <a:ext uri="{91240B29-F687-4f45-9708-019B960494DF}">
-                  <a14:hiddenLine xmlns="" xmlns:a14="http://schemas.microsoft.com/office/drawing/2010/main" w="9525">
+                  <a14:hiddenLine xmlns:a14="http://schemas.microsoft.com/office/drawing/2010/main" xmlns="" w="9525">
                     <a:solidFill>
                       <a:srgbClr val="000000"/>
                     </a:solidFill>
@@ -11551,7 +11551,7 @@
               </a:ln>
               <a:extLst>
                 <a:ext uri="{91240B29-F687-4f45-9708-019B960494DF}">
-                  <a14:hiddenLine xmlns="" xmlns:a14="http://schemas.microsoft.com/office/drawing/2010/main" w="9525">
+                  <a14:hiddenLine xmlns:a14="http://schemas.microsoft.com/office/drawing/2010/main" xmlns="" w="9525">
                     <a:solidFill>
                       <a:srgbClr val="000000"/>
                     </a:solidFill>
@@ -11619,7 +11619,7 @@
               </a:ln>
               <a:extLst>
                 <a:ext uri="{91240B29-F687-4f45-9708-019B960494DF}">
-                  <a14:hiddenLine xmlns="" xmlns:a14="http://schemas.microsoft.com/office/drawing/2010/main" w="9525">
+                  <a14:hiddenLine xmlns:a14="http://schemas.microsoft.com/office/drawing/2010/main" xmlns="" w="9525">
                     <a:solidFill>
                       <a:srgbClr val="000000"/>
                     </a:solidFill>
@@ -11709,7 +11709,7 @@
               </a:ln>
               <a:extLst>
                 <a:ext uri="{91240B29-F687-4f45-9708-019B960494DF}">
-                  <a14:hiddenLine xmlns="" xmlns:a14="http://schemas.microsoft.com/office/drawing/2010/main" w="9525">
+                  <a14:hiddenLine xmlns:a14="http://schemas.microsoft.com/office/drawing/2010/main" xmlns="" w="9525">
                     <a:solidFill>
                       <a:srgbClr val="000000"/>
                     </a:solidFill>
@@ -11777,7 +11777,7 @@
               </a:ln>
               <a:extLst>
                 <a:ext uri="{91240B29-F687-4f45-9708-019B960494DF}">
-                  <a14:hiddenLine xmlns="" xmlns:a14="http://schemas.microsoft.com/office/drawing/2010/main" w="9525">
+                  <a14:hiddenLine xmlns:a14="http://schemas.microsoft.com/office/drawing/2010/main" xmlns="" w="9525">
                     <a:solidFill>
                       <a:srgbClr val="000000"/>
                     </a:solidFill>
@@ -11867,7 +11867,7 @@
               </a:ln>
               <a:extLst>
                 <a:ext uri="{91240B29-F687-4f45-9708-019B960494DF}">
-                  <a14:hiddenLine xmlns="" xmlns:a14="http://schemas.microsoft.com/office/drawing/2010/main" w="9525">
+                  <a14:hiddenLine xmlns:a14="http://schemas.microsoft.com/office/drawing/2010/main" xmlns="" w="9525">
                     <a:solidFill>
                       <a:srgbClr val="000000"/>
                     </a:solidFill>
@@ -11901,7 +11901,7 @@
               </a:ln>
               <a:extLst>
                 <a:ext uri="{91240B29-F687-4f45-9708-019B960494DF}">
-                  <a14:hiddenLine xmlns="" xmlns:a14="http://schemas.microsoft.com/office/drawing/2010/main" w="9525">
+                  <a14:hiddenLine xmlns:a14="http://schemas.microsoft.com/office/drawing/2010/main" xmlns="" w="9525">
                     <a:solidFill>
                       <a:srgbClr val="000000"/>
                     </a:solidFill>
@@ -12041,7 +12041,7 @@
           <a:p>
             <a:fld id="{7FDBF50C-4ABB-48C4-BC36-F12119FAB571}" type="datetimeFigureOut">
               <a:rPr lang="it-IT" smtClean="0"/>
-              <a:t>10/06/2021</a:t>
+              <a:t>11/06/2021</a:t>
             </a:fld>
             <a:endParaRPr lang="it-IT"/>
           </a:p>
@@ -12119,7 +12119,7 @@
           <a:p>
             <a:fld id="{06021973-6F29-4C3C-B47D-AFC1FE0FEEAE}" type="slidenum">
               <a:rPr lang="it-IT" smtClean="0"/>
-              <a:t>‹N›</a:t>
+              <a:t>‹#›</a:t>
             </a:fld>
             <a:endParaRPr lang="it-IT"/>
           </a:p>
@@ -14038,7 +14038,7 @@
                     <a:lumOff val="5000"/>
                   </a:schemeClr>
                 </a:solidFill>
-                <a:latin typeface="Cascadia Code"/>
+                <a:latin typeface="Consolas" panose="020B0609020204030204" pitchFamily="49" charset="0"/>
                 <a:cs typeface="Miriam Mono CLM" panose="02000503000000000000" pitchFamily="2" charset="-79"/>
               </a:rPr>
               <a:t>TIME_STEPS = 1000;</a:t>
@@ -14053,7 +14053,7 @@
                     <a:lumOff val="5000"/>
                   </a:schemeClr>
                 </a:solidFill>
-                <a:latin typeface="Cascadia Code"/>
+                <a:latin typeface="Consolas" panose="020B0609020204030204" pitchFamily="49" charset="0"/>
                 <a:cs typeface="Miriam Mono CLM" panose="02000503000000000000" pitchFamily="2" charset="-79"/>
               </a:rPr>
               <a:t>LATTICE_WIDTH = 150;</a:t>
@@ -14068,7 +14068,7 @@
                     <a:lumOff val="5000"/>
                   </a:schemeClr>
                 </a:solidFill>
-                <a:latin typeface="Cascadia Code"/>
+                <a:latin typeface="Consolas" panose="020B0609020204030204" pitchFamily="49" charset="0"/>
                 <a:cs typeface="Miriam Mono CLM" panose="02000503000000000000" pitchFamily="2" charset="-79"/>
               </a:rPr>
               <a:t>LATTICE_HEIGHT = 150;</a:t>
@@ -14083,7 +14083,7 @@
                     <a:lumOff val="5000"/>
                   </a:schemeClr>
                 </a:solidFill>
-                <a:latin typeface="Cascadia Code"/>
+                <a:latin typeface="Consolas" panose="020B0609020204030204" pitchFamily="49" charset="0"/>
                 <a:cs typeface="Miriam Mono CLM" panose="02000503000000000000" pitchFamily="2" charset="-79"/>
               </a:rPr>
               <a:t>PHOTON_SATURATION = 25;</a:t>
@@ -14097,7 +14097,7 @@
                   <a:lumOff val="5000"/>
                 </a:schemeClr>
               </a:solidFill>
-              <a:latin typeface="Cascadia Code"/>
+              <a:latin typeface="Consolas" panose="020B0609020204030204" pitchFamily="49" charset="0"/>
               <a:cs typeface="Miriam Mono CLM" panose="02000503000000000000" pitchFamily="2" charset="-79"/>
             </a:endParaRPr>
           </a:p>
@@ -14110,7 +14110,7 @@
                     <a:lumOff val="5000"/>
                   </a:schemeClr>
                 </a:solidFill>
-                <a:latin typeface="Cascadia Code"/>
+                <a:latin typeface="Consolas" panose="020B0609020204030204" pitchFamily="49" charset="0"/>
                 <a:cs typeface="Miriam Mono CLM" panose="02000503000000000000" pitchFamily="2" charset="-79"/>
               </a:rPr>
               <a:t>electronLifeTime</a:t>
@@ -14123,7 +14123,7 @@
                     <a:lumOff val="5000"/>
                   </a:schemeClr>
                 </a:solidFill>
-                <a:latin typeface="Cascadia Code"/>
+                <a:latin typeface="Consolas" panose="020B0609020204030204" pitchFamily="49" charset="0"/>
                 <a:cs typeface="Miriam Mono CLM" panose="02000503000000000000" pitchFamily="2" charset="-79"/>
               </a:rPr>
               <a:t> = 30;</a:t>
@@ -14138,7 +14138,7 @@
                     <a:lumOff val="5000"/>
                   </a:schemeClr>
                 </a:solidFill>
-                <a:latin typeface="Cascadia Code"/>
+                <a:latin typeface="Consolas" panose="020B0609020204030204" pitchFamily="49" charset="0"/>
                 <a:cs typeface="Miriam Mono CLM" panose="02000503000000000000" pitchFamily="2" charset="-79"/>
               </a:rPr>
               <a:t>photonLifeTime</a:t>
@@ -14151,7 +14151,7 @@
                     <a:lumOff val="5000"/>
                   </a:schemeClr>
                 </a:solidFill>
-                <a:latin typeface="Cascadia Code"/>
+                <a:latin typeface="Consolas" panose="020B0609020204030204" pitchFamily="49" charset="0"/>
                 <a:cs typeface="Miriam Mono CLM" panose="02000503000000000000" pitchFamily="2" charset="-79"/>
               </a:rPr>
               <a:t> = 10;</a:t>
@@ -14166,7 +14166,7 @@
                     <a:lumOff val="5000"/>
                   </a:schemeClr>
                 </a:solidFill>
-                <a:latin typeface="Cascadia Code"/>
+                <a:latin typeface="Consolas" panose="020B0609020204030204" pitchFamily="49" charset="0"/>
                 <a:cs typeface="Miriam Mono CLM" panose="02000503000000000000" pitchFamily="2" charset="-79"/>
               </a:rPr>
               <a:t>pumpingProbability</a:t>
@@ -14179,7 +14179,7 @@
                     <a:lumOff val="5000"/>
                   </a:schemeClr>
                 </a:solidFill>
-                <a:latin typeface="Cascadia Code"/>
+                <a:latin typeface="Consolas" panose="020B0609020204030204" pitchFamily="49" charset="0"/>
                 <a:cs typeface="Miriam Mono CLM" panose="02000503000000000000" pitchFamily="2" charset="-79"/>
               </a:rPr>
               <a:t> = 0.192;</a:t>
@@ -14194,7 +14194,7 @@
                     <a:lumOff val="5000"/>
                   </a:schemeClr>
                 </a:solidFill>
-                <a:latin typeface="Cascadia Code"/>
+                <a:latin typeface="Consolas" panose="020B0609020204030204" pitchFamily="49" charset="0"/>
                 <a:cs typeface="Miriam Mono CLM" panose="02000503000000000000" pitchFamily="2" charset="-79"/>
               </a:rPr>
               <a:t>stimulatedEmissionThreshold</a:t>
@@ -14207,7 +14207,7 @@
                     <a:lumOff val="5000"/>
                   </a:schemeClr>
                 </a:solidFill>
-                <a:latin typeface="Cascadia Code"/>
+                <a:latin typeface="Consolas" panose="020B0609020204030204" pitchFamily="49" charset="0"/>
                 <a:cs typeface="Miriam Mono CLM" panose="02000503000000000000" pitchFamily="2" charset="-79"/>
               </a:rPr>
               <a:t> = 1;</a:t>
@@ -14222,7 +14222,7 @@
                     <a:lumOff val="5000"/>
                   </a:schemeClr>
                 </a:solidFill>
-                <a:latin typeface="Cascadia Code"/>
+                <a:latin typeface="Consolas" panose="020B0609020204030204" pitchFamily="49" charset="0"/>
                 <a:cs typeface="Miriam Mono CLM" panose="02000503000000000000" pitchFamily="2" charset="-79"/>
               </a:rPr>
               <a:t>thermalExcitingProbability</a:t>
@@ -14235,7 +14235,7 @@
                     <a:lumOff val="5000"/>
                   </a:schemeClr>
                 </a:solidFill>
-                <a:latin typeface="Cascadia Code"/>
+                <a:latin typeface="Consolas" panose="020B0609020204030204" pitchFamily="49" charset="0"/>
                 <a:cs typeface="Miriam Mono CLM" panose="02000503000000000000" pitchFamily="2" charset="-79"/>
               </a:rPr>
               <a:t> = 0.001;</a:t>
@@ -14250,7 +14250,7 @@
                     <a:lumOff val="5000"/>
                   </a:schemeClr>
                 </a:solidFill>
-                <a:latin typeface="Cascadia Code"/>
+                <a:latin typeface="Consolas" panose="020B0609020204030204" pitchFamily="49" charset="0"/>
                 <a:cs typeface="Miriam Mono CLM" panose="02000503000000000000" pitchFamily="2" charset="-79"/>
               </a:rPr>
               <a:t>spontaneousEmissionProbability</a:t>
@@ -14263,7 +14263,7 @@
                     <a:lumOff val="5000"/>
                   </a:schemeClr>
                 </a:solidFill>
-                <a:latin typeface="Cascadia Code"/>
+                <a:latin typeface="Consolas" panose="020B0609020204030204" pitchFamily="49" charset="0"/>
                 <a:cs typeface="Miriam Mono CLM" panose="02000503000000000000" pitchFamily="2" charset="-79"/>
               </a:rPr>
               <a:t> = 0.02;</a:t>
@@ -14377,8 +14377,8 @@
           </a:p>
         </p:txBody>
       </p:sp>
-      <mc:AlternateContent xmlns:mc="http://schemas.openxmlformats.org/markup-compatibility/2006">
-        <mc:Choice xmlns:a14="http://schemas.microsoft.com/office/drawing/2010/main" Requires="a14">
+      <mc:AlternateContent xmlns:mc="http://schemas.openxmlformats.org/markup-compatibility/2006" xmlns:a14="http://schemas.microsoft.com/office/drawing/2010/main">
+        <mc:Choice Requires="a14">
           <p:sp>
             <p:nvSpPr>
               <p:cNvPr id="6" name="CasellaDiTesto 5">
@@ -14525,7 +14525,7 @@
                     <m:sSub>
                       <m:sSubPr>
                         <m:ctrlPr>
-                          <a:rPr lang="it-IT" b="0" i="0" dirty="0" smtClean="0">
+                          <a:rPr lang="it-IT" b="0" i="1" dirty="0" smtClean="0">
                             <a:latin typeface="Cambria Math" panose="02040503050406030204" pitchFamily="18" charset="0"/>
                           </a:rPr>
                         </m:ctrlPr>
@@ -15017,7 +15017,7 @@
             </p:txBody>
           </p:sp>
         </mc:Choice>
-        <mc:Fallback>
+        <mc:Fallback xmlns="">
           <p:sp>
             <p:nvSpPr>
               <p:cNvPr id="6" name="CasellaDiTesto 5">
@@ -16913,7 +16913,7 @@
                     <a:lumOff val="5000"/>
                   </a:schemeClr>
                 </a:solidFill>
-                <a:latin typeface="Cascadia Code" pitchFamily="1" charset="0"/>
+                <a:latin typeface="Consolas" panose="020B0609020204030204" pitchFamily="49" charset="0"/>
                 <a:cs typeface="Cascadia Code" pitchFamily="1" charset="0"/>
               </a:rPr>
               <a:t>TIME_STEPS = 200;</a:t>
@@ -16928,7 +16928,7 @@
                     <a:lumOff val="5000"/>
                   </a:schemeClr>
                 </a:solidFill>
-                <a:latin typeface="Cascadia Code" pitchFamily="1" charset="0"/>
+                <a:latin typeface="Consolas" panose="020B0609020204030204" pitchFamily="49" charset="0"/>
                 <a:cs typeface="Cascadia Code" pitchFamily="1" charset="0"/>
               </a:rPr>
               <a:t>LATTICE_WIDTH = 200;</a:t>
@@ -16943,7 +16943,7 @@
                     <a:lumOff val="5000"/>
                   </a:schemeClr>
                 </a:solidFill>
-                <a:latin typeface="Cascadia Code" pitchFamily="1" charset="0"/>
+                <a:latin typeface="Consolas" panose="020B0609020204030204" pitchFamily="49" charset="0"/>
                 <a:cs typeface="Cascadia Code" pitchFamily="1" charset="0"/>
               </a:rPr>
               <a:t>LATTICE_HEIGHT = 200;</a:t>
@@ -16958,7 +16958,7 @@
                     <a:lumOff val="5000"/>
                   </a:schemeClr>
                 </a:solidFill>
-                <a:latin typeface="Cascadia Code" pitchFamily="1" charset="0"/>
+                <a:latin typeface="Consolas" panose="020B0609020204030204" pitchFamily="49" charset="0"/>
                 <a:cs typeface="Cascadia Code" pitchFamily="1" charset="0"/>
               </a:rPr>
               <a:t>PHOTON_SATURATION = 25;</a:t>
@@ -16972,7 +16972,7 @@
                   <a:lumOff val="5000"/>
                 </a:schemeClr>
               </a:solidFill>
-              <a:latin typeface="Cascadia Code" pitchFamily="1" charset="0"/>
+              <a:latin typeface="Consolas" panose="020B0609020204030204" pitchFamily="49" charset="0"/>
               <a:cs typeface="Cascadia Code" pitchFamily="1" charset="0"/>
             </a:endParaRPr>
           </a:p>
@@ -16985,7 +16985,7 @@
                     <a:lumOff val="5000"/>
                   </a:schemeClr>
                 </a:solidFill>
-                <a:latin typeface="Cascadia Code" pitchFamily="1" charset="0"/>
+                <a:latin typeface="Consolas" panose="020B0609020204030204" pitchFamily="49" charset="0"/>
                 <a:cs typeface="Cascadia Code" pitchFamily="1" charset="0"/>
               </a:rPr>
               <a:t>electronLifeTime</a:t>
@@ -16998,7 +16998,7 @@
                     <a:lumOff val="5000"/>
                   </a:schemeClr>
                 </a:solidFill>
-                <a:latin typeface="Cascadia Code" pitchFamily="1" charset="0"/>
+                <a:latin typeface="Consolas" panose="020B0609020204030204" pitchFamily="49" charset="0"/>
                 <a:cs typeface="Cascadia Code" pitchFamily="1" charset="0"/>
               </a:rPr>
               <a:t> = 30;</a:t>
@@ -17013,7 +17013,7 @@
                     <a:lumOff val="5000"/>
                   </a:schemeClr>
                 </a:solidFill>
-                <a:latin typeface="Cascadia Code" pitchFamily="1" charset="0"/>
+                <a:latin typeface="Consolas" panose="020B0609020204030204" pitchFamily="49" charset="0"/>
                 <a:cs typeface="Cascadia Code" pitchFamily="1" charset="0"/>
               </a:rPr>
               <a:t>photonLifeTime</a:t>
@@ -17026,7 +17026,7 @@
                     <a:lumOff val="5000"/>
                   </a:schemeClr>
                 </a:solidFill>
-                <a:latin typeface="Cascadia Code" pitchFamily="1" charset="0"/>
+                <a:latin typeface="Consolas" panose="020B0609020204030204" pitchFamily="49" charset="0"/>
                 <a:cs typeface="Cascadia Code" pitchFamily="1" charset="0"/>
               </a:rPr>
               <a:t> = 10;</a:t>
@@ -17041,7 +17041,7 @@
                     <a:lumOff val="5000"/>
                   </a:schemeClr>
                 </a:solidFill>
-                <a:latin typeface="Cascadia Code" pitchFamily="1" charset="0"/>
+                <a:latin typeface="Consolas" panose="020B0609020204030204" pitchFamily="49" charset="0"/>
                 <a:cs typeface="Cascadia Code" pitchFamily="1" charset="0"/>
               </a:rPr>
               <a:t>pumpingProbability</a:t>
@@ -17054,7 +17054,7 @@
                     <a:lumOff val="5000"/>
                   </a:schemeClr>
                 </a:solidFill>
-                <a:latin typeface="Cascadia Code" pitchFamily="1" charset="0"/>
+                <a:latin typeface="Consolas" panose="020B0609020204030204" pitchFamily="49" charset="0"/>
                 <a:cs typeface="Cascadia Code" pitchFamily="1" charset="0"/>
               </a:rPr>
               <a:t> = 0.192;</a:t>
@@ -17069,7 +17069,7 @@
                     <a:lumOff val="5000"/>
                   </a:schemeClr>
                 </a:solidFill>
-                <a:latin typeface="Cascadia Code" pitchFamily="1" charset="0"/>
+                <a:latin typeface="Consolas" panose="020B0609020204030204" pitchFamily="49" charset="0"/>
                 <a:cs typeface="Cascadia Code" pitchFamily="1" charset="0"/>
               </a:rPr>
               <a:t>noiseProbability</a:t>
@@ -17082,7 +17082,7 @@
                     <a:lumOff val="5000"/>
                   </a:schemeClr>
                 </a:solidFill>
-                <a:latin typeface="Cascadia Code" pitchFamily="1" charset="0"/>
+                <a:latin typeface="Consolas" panose="020B0609020204030204" pitchFamily="49" charset="0"/>
                 <a:cs typeface="Cascadia Code" pitchFamily="1" charset="0"/>
               </a:rPr>
               <a:t> = 0.009;</a:t>
@@ -17097,7 +17097,7 @@
                     <a:lumOff val="5000"/>
                   </a:schemeClr>
                 </a:solidFill>
-                <a:latin typeface="Cascadia Code" pitchFamily="1" charset="0"/>
+                <a:latin typeface="Consolas" panose="020B0609020204030204" pitchFamily="49" charset="0"/>
                 <a:cs typeface="Cascadia Code" pitchFamily="1" charset="0"/>
               </a:rPr>
               <a:t>stimulatedEmissionThreshold</a:t>
@@ -17110,7 +17110,7 @@
                     <a:lumOff val="5000"/>
                   </a:schemeClr>
                 </a:solidFill>
-                <a:latin typeface="Cascadia Code" pitchFamily="1" charset="0"/>
+                <a:latin typeface="Consolas" panose="020B0609020204030204" pitchFamily="49" charset="0"/>
                 <a:cs typeface="Cascadia Code" pitchFamily="1" charset="0"/>
               </a:rPr>
               <a:t> = 1;</a:t>
@@ -17490,7 +17490,7 @@
                     <a:lumOff val="5000"/>
                   </a:schemeClr>
                 </a:solidFill>
-                <a:latin typeface="Cascadia Code" pitchFamily="1" charset="0"/>
+                <a:latin typeface="Consolas" panose="020B0609020204030204" pitchFamily="49" charset="0"/>
                 <a:cs typeface="Cascadia Code" pitchFamily="1" charset="0"/>
               </a:rPr>
               <a:t>TIME_STEPS = 1000;</a:t>
@@ -17505,7 +17505,7 @@
                     <a:lumOff val="5000"/>
                   </a:schemeClr>
                 </a:solidFill>
-                <a:latin typeface="Cascadia Code" pitchFamily="1" charset="0"/>
+                <a:latin typeface="Consolas" panose="020B0609020204030204" pitchFamily="49" charset="0"/>
                 <a:cs typeface="Cascadia Code" pitchFamily="1" charset="0"/>
               </a:rPr>
               <a:t>LATTICE_WIDTH = 150;</a:t>
@@ -17520,7 +17520,7 @@
                     <a:lumOff val="5000"/>
                   </a:schemeClr>
                 </a:solidFill>
-                <a:latin typeface="Cascadia Code" pitchFamily="1" charset="0"/>
+                <a:latin typeface="Consolas" panose="020B0609020204030204" pitchFamily="49" charset="0"/>
                 <a:cs typeface="Cascadia Code" pitchFamily="1" charset="0"/>
               </a:rPr>
               <a:t>LATTICE_HEIGHT = 150;</a:t>
@@ -17535,7 +17535,7 @@
                     <a:lumOff val="5000"/>
                   </a:schemeClr>
                 </a:solidFill>
-                <a:latin typeface="Cascadia Code" pitchFamily="1" charset="0"/>
+                <a:latin typeface="Consolas" panose="020B0609020204030204" pitchFamily="49" charset="0"/>
                 <a:cs typeface="Cascadia Code" pitchFamily="1" charset="0"/>
               </a:rPr>
               <a:t>PHOTON_SATURATION = 25;</a:t>
@@ -17549,7 +17549,7 @@
                   <a:lumOff val="5000"/>
                 </a:schemeClr>
               </a:solidFill>
-              <a:latin typeface="Cascadia Code" pitchFamily="1" charset="0"/>
+              <a:latin typeface="Consolas" panose="020B0609020204030204" pitchFamily="49" charset="0"/>
               <a:cs typeface="Cascadia Code" pitchFamily="1" charset="0"/>
             </a:endParaRPr>
           </a:p>
@@ -17562,7 +17562,7 @@
                     <a:lumOff val="5000"/>
                   </a:schemeClr>
                 </a:solidFill>
-                <a:latin typeface="Cascadia Code" pitchFamily="1" charset="0"/>
+                <a:latin typeface="Consolas" panose="020B0609020204030204" pitchFamily="49" charset="0"/>
                 <a:cs typeface="Cascadia Code" pitchFamily="1" charset="0"/>
               </a:rPr>
               <a:t>electronLifeTime</a:t>
@@ -17575,7 +17575,7 @@
                     <a:lumOff val="5000"/>
                   </a:schemeClr>
                 </a:solidFill>
-                <a:latin typeface="Cascadia Code" pitchFamily="1" charset="0"/>
+                <a:latin typeface="Consolas" panose="020B0609020204030204" pitchFamily="49" charset="0"/>
                 <a:cs typeface="Cascadia Code" pitchFamily="1" charset="0"/>
               </a:rPr>
               <a:t> = 180;</a:t>
@@ -17590,7 +17590,7 @@
                     <a:lumOff val="5000"/>
                   </a:schemeClr>
                 </a:solidFill>
-                <a:latin typeface="Cascadia Code" pitchFamily="1" charset="0"/>
+                <a:latin typeface="Consolas" panose="020B0609020204030204" pitchFamily="49" charset="0"/>
                 <a:cs typeface="Cascadia Code" pitchFamily="1" charset="0"/>
               </a:rPr>
               <a:t>photonLifeTime</a:t>
@@ -17603,7 +17603,7 @@
                     <a:lumOff val="5000"/>
                   </a:schemeClr>
                 </a:solidFill>
-                <a:latin typeface="Cascadia Code" pitchFamily="1" charset="0"/>
+                <a:latin typeface="Consolas" panose="020B0609020204030204" pitchFamily="49" charset="0"/>
                 <a:cs typeface="Cascadia Code" pitchFamily="1" charset="0"/>
               </a:rPr>
               <a:t> = 10;</a:t>
@@ -17618,7 +17618,7 @@
                     <a:lumOff val="5000"/>
                   </a:schemeClr>
                 </a:solidFill>
-                <a:latin typeface="Cascadia Code" pitchFamily="1" charset="0"/>
+                <a:latin typeface="Consolas" panose="020B0609020204030204" pitchFamily="49" charset="0"/>
                 <a:cs typeface="Cascadia Code" pitchFamily="1" charset="0"/>
               </a:rPr>
               <a:t>pumpingProbability</a:t>
@@ -17631,7 +17631,7 @@
                     <a:lumOff val="5000"/>
                   </a:schemeClr>
                 </a:solidFill>
-                <a:latin typeface="Cascadia Code" pitchFamily="1" charset="0"/>
+                <a:latin typeface="Consolas" panose="020B0609020204030204" pitchFamily="49" charset="0"/>
                 <a:cs typeface="Cascadia Code" pitchFamily="1" charset="0"/>
               </a:rPr>
               <a:t> = 0.0125;</a:t>
@@ -17646,7 +17646,7 @@
                     <a:lumOff val="5000"/>
                   </a:schemeClr>
                 </a:solidFill>
-                <a:latin typeface="Cascadia Code" pitchFamily="1" charset="0"/>
+                <a:latin typeface="Consolas" panose="020B0609020204030204" pitchFamily="49" charset="0"/>
                 <a:cs typeface="Cascadia Code" pitchFamily="1" charset="0"/>
               </a:rPr>
               <a:t>noiseProbability</a:t>
@@ -17659,7 +17659,7 @@
                     <a:lumOff val="5000"/>
                   </a:schemeClr>
                 </a:solidFill>
-                <a:latin typeface="Cascadia Code" pitchFamily="1" charset="0"/>
+                <a:latin typeface="Consolas" panose="020B0609020204030204" pitchFamily="49" charset="0"/>
                 <a:cs typeface="Cascadia Code" pitchFamily="1" charset="0"/>
               </a:rPr>
               <a:t> = 0.0001;</a:t>
@@ -17674,7 +17674,7 @@
                     <a:lumOff val="5000"/>
                   </a:schemeClr>
                 </a:solidFill>
-                <a:latin typeface="Cascadia Code" pitchFamily="1" charset="0"/>
+                <a:latin typeface="Consolas" panose="020B0609020204030204" pitchFamily="49" charset="0"/>
                 <a:cs typeface="Cascadia Code" pitchFamily="1" charset="0"/>
               </a:rPr>
               <a:t>stimulatedEmissionThreshold</a:t>
@@ -17687,7 +17687,7 @@
                     <a:lumOff val="5000"/>
                   </a:schemeClr>
                 </a:solidFill>
-                <a:latin typeface="Cascadia Code" pitchFamily="1" charset="0"/>
+                <a:latin typeface="Consolas" panose="020B0609020204030204" pitchFamily="49" charset="0"/>
                 <a:cs typeface="Cascadia Code" pitchFamily="1" charset="0"/>
               </a:rPr>
               <a:t> = 1</a:t>
@@ -17700,7 +17700,7 @@
                     <a:lumOff val="5000"/>
                   </a:schemeClr>
                 </a:solidFill>
-                <a:latin typeface="Miriam Mono CLM" panose="02000503000000000000" pitchFamily="2" charset="-79"/>
+                <a:latin typeface="Consolas" panose="020B0609020204030204" pitchFamily="49" charset="0"/>
                 <a:cs typeface="Miriam Mono CLM" panose="02000503000000000000" pitchFamily="2" charset="-79"/>
               </a:rPr>
               <a:t>;</a:t>
@@ -18007,7 +18007,7 @@
                     <a:lumOff val="5000"/>
                   </a:schemeClr>
                 </a:solidFill>
-                <a:latin typeface="Cascadia Code" pitchFamily="1" charset="0"/>
+                <a:latin typeface="Consolas" panose="020B0609020204030204" pitchFamily="49" charset="0"/>
                 <a:cs typeface="Cascadia Code" pitchFamily="1" charset="0"/>
               </a:rPr>
               <a:t>TIME_STEPS = 200;</a:t>
@@ -18022,7 +18022,7 @@
                     <a:lumOff val="5000"/>
                   </a:schemeClr>
                 </a:solidFill>
-                <a:latin typeface="Cascadia Code" pitchFamily="1" charset="0"/>
+                <a:latin typeface="Consolas" panose="020B0609020204030204" pitchFamily="49" charset="0"/>
                 <a:cs typeface="Cascadia Code" pitchFamily="1" charset="0"/>
               </a:rPr>
               <a:t>LATTICE_WIDTH = 100;</a:t>
@@ -18037,7 +18037,7 @@
                     <a:lumOff val="5000"/>
                   </a:schemeClr>
                 </a:solidFill>
-                <a:latin typeface="Cascadia Code" pitchFamily="1" charset="0"/>
+                <a:latin typeface="Consolas" panose="020B0609020204030204" pitchFamily="49" charset="0"/>
                 <a:cs typeface="Cascadia Code" pitchFamily="1" charset="0"/>
               </a:rPr>
               <a:t>LATTICE_HEIGHT = 100;</a:t>
@@ -18052,7 +18052,7 @@
                     <a:lumOff val="5000"/>
                   </a:schemeClr>
                 </a:solidFill>
-                <a:latin typeface="Cascadia Code" pitchFamily="1" charset="0"/>
+                <a:latin typeface="Consolas" panose="020B0609020204030204" pitchFamily="49" charset="0"/>
                 <a:cs typeface="Cascadia Code" pitchFamily="1" charset="0"/>
               </a:rPr>
               <a:t>PHOTON_SATURATION = 40;</a:t>
@@ -18066,7 +18066,7 @@
                   <a:lumOff val="5000"/>
                 </a:schemeClr>
               </a:solidFill>
-              <a:latin typeface="Cascadia Code" pitchFamily="1" charset="0"/>
+              <a:latin typeface="Consolas" panose="020B0609020204030204" pitchFamily="49" charset="0"/>
               <a:cs typeface="Cascadia Code" pitchFamily="1" charset="0"/>
             </a:endParaRPr>
           </a:p>
@@ -18079,7 +18079,7 @@
                     <a:lumOff val="5000"/>
                   </a:schemeClr>
                 </a:solidFill>
-                <a:latin typeface="Cascadia Code" pitchFamily="1" charset="0"/>
+                <a:latin typeface="Consolas" panose="020B0609020204030204" pitchFamily="49" charset="0"/>
                 <a:cs typeface="Cascadia Code" pitchFamily="1" charset="0"/>
               </a:rPr>
               <a:t>electronLifeTime</a:t>
@@ -18092,7 +18092,7 @@
                     <a:lumOff val="5000"/>
                   </a:schemeClr>
                 </a:solidFill>
-                <a:latin typeface="Cascadia Code" pitchFamily="1" charset="0"/>
+                <a:latin typeface="Consolas" panose="020B0609020204030204" pitchFamily="49" charset="0"/>
                 <a:cs typeface="Cascadia Code" pitchFamily="1" charset="0"/>
               </a:rPr>
               <a:t> = 30;</a:t>
@@ -18107,7 +18107,7 @@
                     <a:lumOff val="5000"/>
                   </a:schemeClr>
                 </a:solidFill>
-                <a:latin typeface="Cascadia Code" pitchFamily="1" charset="0"/>
+                <a:latin typeface="Consolas" panose="020B0609020204030204" pitchFamily="49" charset="0"/>
                 <a:cs typeface="Cascadia Code" pitchFamily="1" charset="0"/>
               </a:rPr>
               <a:t>photonLifeTime</a:t>
@@ -18120,7 +18120,7 @@
                     <a:lumOff val="5000"/>
                   </a:schemeClr>
                 </a:solidFill>
-                <a:latin typeface="Cascadia Code" pitchFamily="1" charset="0"/>
+                <a:latin typeface="Consolas" panose="020B0609020204030204" pitchFamily="49" charset="0"/>
                 <a:cs typeface="Cascadia Code" pitchFamily="1" charset="0"/>
               </a:rPr>
               <a:t> = 10;</a:t>
@@ -18135,7 +18135,7 @@
                     <a:lumOff val="5000"/>
                   </a:schemeClr>
                 </a:solidFill>
-                <a:latin typeface="Cascadia Code" pitchFamily="1" charset="0"/>
+                <a:latin typeface="Consolas" panose="020B0609020204030204" pitchFamily="49" charset="0"/>
                 <a:cs typeface="Cascadia Code" pitchFamily="1" charset="0"/>
               </a:rPr>
               <a:t>pumpingProbability</a:t>
@@ -18148,7 +18148,7 @@
                     <a:lumOff val="5000"/>
                   </a:schemeClr>
                 </a:solidFill>
-                <a:latin typeface="Cascadia Code" pitchFamily="1" charset="0"/>
+                <a:latin typeface="Consolas" panose="020B0609020204030204" pitchFamily="49" charset="0"/>
                 <a:cs typeface="Cascadia Code" pitchFamily="1" charset="0"/>
               </a:rPr>
               <a:t> = 0.2;</a:t>
@@ -18163,7 +18163,7 @@
                     <a:lumOff val="5000"/>
                   </a:schemeClr>
                 </a:solidFill>
-                <a:latin typeface="Cascadia Code" pitchFamily="1" charset="0"/>
+                <a:latin typeface="Consolas" panose="020B0609020204030204" pitchFamily="49" charset="0"/>
                 <a:cs typeface="Cascadia Code" pitchFamily="1" charset="0"/>
               </a:rPr>
               <a:t>noiseProbability</a:t>
@@ -18176,7 +18176,7 @@
                     <a:lumOff val="5000"/>
                   </a:schemeClr>
                 </a:solidFill>
-                <a:latin typeface="Cascadia Code" pitchFamily="1" charset="0"/>
+                <a:latin typeface="Consolas" panose="020B0609020204030204" pitchFamily="49" charset="0"/>
                 <a:cs typeface="Cascadia Code" pitchFamily="1" charset="0"/>
               </a:rPr>
               <a:t> = 0.01;</a:t>
@@ -18191,7 +18191,7 @@
                     <a:lumOff val="5000"/>
                   </a:schemeClr>
                 </a:solidFill>
-                <a:latin typeface="Cascadia Code" pitchFamily="1" charset="0"/>
+                <a:latin typeface="Consolas" panose="020B0609020204030204" pitchFamily="49" charset="0"/>
                 <a:cs typeface="Cascadia Code" pitchFamily="1" charset="0"/>
               </a:rPr>
               <a:t>stimulatedEmissionThreshold</a:t>
@@ -18204,7 +18204,7 @@
                     <a:lumOff val="5000"/>
                   </a:schemeClr>
                 </a:solidFill>
-                <a:latin typeface="Cascadia Code" pitchFamily="1" charset="0"/>
+                <a:latin typeface="Consolas" panose="020B0609020204030204" pitchFamily="49" charset="0"/>
                 <a:cs typeface="Cascadia Code" pitchFamily="1" charset="0"/>
               </a:rPr>
               <a:t> = 1;</a:t>

</xml_diff>